<commit_message>
added fixes discovered during tutorial at Percona Live
</commit_message>
<xml_diff>
--- a/slides/Hadoop ETL for Percona Live - Part 2.pptx
+++ b/slides/Hadoop ETL for Percona Live - Part 2.pptx
@@ -222,7 +222,7 @@
             <a:fld id="{38BC9C91-C481-4347-9C82-F639A2159BD0}" type="datetimeFigureOut">
               <a:rPr lang="en-US" smtClean="0"/>
               <a:pPr/>
-              <a:t>3/31/14</a:t>
+              <a:t>4/1/14</a:t>
             </a:fld>
             <a:endParaRPr lang="en-US"/>
           </a:p>
@@ -1060,7 +1060,7 @@
             <a:fld id="{B3B31D53-9C00-4AE9-B6C1-0DA51F1C2E9A}" type="datetime1">
               <a:rPr lang="en-US" smtClean="0"/>
               <a:pPr/>
-              <a:t>3/31/14</a:t>
+              <a:t>4/1/14</a:t>
             </a:fld>
             <a:endParaRPr lang="en-US"/>
           </a:p>
@@ -1237,7 +1237,7 @@
             <a:fld id="{9D3285E8-844F-47C5-8CFA-343A97004DFC}" type="datetime1">
               <a:rPr lang="en-US" smtClean="0"/>
               <a:pPr/>
-              <a:t>3/31/14</a:t>
+              <a:t>4/1/14</a:t>
             </a:fld>
             <a:endParaRPr lang="en-US"/>
           </a:p>
@@ -1404,7 +1404,7 @@
             <a:fld id="{B8EDA7C9-9A9E-42EE-BEDF-41CA9C6B60EC}" type="datetime1">
               <a:rPr lang="en-US" smtClean="0"/>
               <a:pPr/>
-              <a:t>3/31/14</a:t>
+              <a:t>4/1/14</a:t>
             </a:fld>
             <a:endParaRPr lang="en-US"/>
           </a:p>
@@ -1647,7 +1647,7 @@
             <a:fld id="{A03743C0-5D09-4BF8-A409-B16E158A72E0}" type="datetime1">
               <a:rPr lang="en-US" smtClean="0"/>
               <a:pPr/>
-              <a:t>3/31/14</a:t>
+              <a:t>4/1/14</a:t>
             </a:fld>
             <a:endParaRPr lang="en-US"/>
           </a:p>
@@ -1932,7 +1932,7 @@
             <a:fld id="{25BAA3C7-4550-49F0-828D-2B0066B1A457}" type="datetime1">
               <a:rPr lang="en-US" smtClean="0"/>
               <a:pPr/>
-              <a:t>3/31/14</a:t>
+              <a:t>4/1/14</a:t>
             </a:fld>
             <a:endParaRPr lang="en-US"/>
           </a:p>
@@ -2351,7 +2351,7 @@
             <a:fld id="{CF1135EC-94CF-4A7B-8B05-046D1086E758}" type="datetime1">
               <a:rPr lang="en-US" smtClean="0"/>
               <a:pPr/>
-              <a:t>3/31/14</a:t>
+              <a:t>4/1/14</a:t>
             </a:fld>
             <a:endParaRPr lang="en-US"/>
           </a:p>
@@ -2466,7 +2466,7 @@
             <a:fld id="{1DE457C0-133C-4436-8D62-5B24B1683748}" type="datetime1">
               <a:rPr lang="en-US" smtClean="0"/>
               <a:pPr/>
-              <a:t>3/31/14</a:t>
+              <a:t>4/1/14</a:t>
             </a:fld>
             <a:endParaRPr lang="en-US"/>
           </a:p>
@@ -2558,7 +2558,7 @@
             <a:fld id="{8A19B35F-870D-479F-8C39-DD68DF14BBA2}" type="datetime1">
               <a:rPr lang="en-US" smtClean="0"/>
               <a:pPr/>
-              <a:t>3/31/14</a:t>
+              <a:t>4/1/14</a:t>
             </a:fld>
             <a:endParaRPr lang="en-US"/>
           </a:p>
@@ -2832,7 +2832,7 @@
             <a:fld id="{2A0D9FFA-65F6-4713-92D8-20602086B7F2}" type="datetime1">
               <a:rPr lang="en-US" smtClean="0"/>
               <a:pPr/>
-              <a:t>3/31/14</a:t>
+              <a:t>4/1/14</a:t>
             </a:fld>
             <a:endParaRPr lang="en-US"/>
           </a:p>
@@ -3082,7 +3082,7 @@
             <a:fld id="{C241761C-728E-4ECF-BC0E-C8D60A9C559A}" type="datetime1">
               <a:rPr lang="en-US" smtClean="0"/>
               <a:pPr/>
-              <a:t>3/31/14</a:t>
+              <a:t>4/1/14</a:t>
             </a:fld>
             <a:endParaRPr lang="en-US"/>
           </a:p>
@@ -3322,7 +3322,7 @@
             <a:fld id="{8F696A73-2943-4634-8220-E1C72524DCDB}" type="datetime1">
               <a:rPr lang="en-US" smtClean="0"/>
               <a:pPr/>
-              <a:t>3/31/14</a:t>
+              <a:t>4/1/14</a:t>
             </a:fld>
             <a:endParaRPr lang="en-US"/>
           </a:p>
@@ -3948,6 +3948,13 @@
   <p:clrMapOvr>
     <a:masterClrMapping/>
   </p:clrMapOvr>
+  <p:timing>
+    <p:tnLst>
+      <p:par>
+        <p:cTn xmlns:p14="http://schemas.microsoft.com/office/powerpoint/2010/main" id="1" dur="indefinite" restart="never" nodeType="tmRoot"/>
+      </p:par>
+    </p:tnLst>
+  </p:timing>
 </p:sld>
 </file>
 
@@ -4018,17 +4025,8 @@
             </a:pPr>
             <a:r>
               <a:rPr lang="en-US" dirty="0" smtClean="0"/>
-              <a:t>List </a:t>
-            </a:r>
-            <a:r>
-              <a:rPr lang="en-US" dirty="0"/>
-              <a:t>databases using </a:t>
-            </a:r>
-            <a:r>
-              <a:rPr lang="en-US" dirty="0" err="1" smtClean="0"/>
-              <a:t>Sqoop</a:t>
-            </a:r>
-            <a:endParaRPr lang="en-US" dirty="0" smtClean="0"/>
+              <a:t>Start MySQL</a:t>
+            </a:r>
           </a:p>
           <a:p>
             <a:pPr marL="514350" indent="-514350">
@@ -4041,7 +4039,7 @@
             </a:r>
             <a:r>
               <a:rPr lang="en-US" dirty="0"/>
-              <a:t>tables in database "world" using </a:t>
+              <a:t>databases using </a:t>
             </a:r>
             <a:r>
               <a:rPr lang="en-US" dirty="0" err="1" smtClean="0"/>
@@ -4056,24 +4054,17 @@
             </a:pPr>
             <a:r>
               <a:rPr lang="en-US" dirty="0" smtClean="0"/>
-              <a:t>Load </a:t>
+              <a:t>List </a:t>
             </a:r>
             <a:r>
               <a:rPr lang="en-US" dirty="0"/>
-              <a:t>“</a:t>
-            </a:r>
-            <a:r>
-              <a:rPr lang="en-US" dirty="0" err="1"/>
-              <a:t>cities_coords</a:t>
-            </a:r>
-            <a:r>
-              <a:rPr lang="en-US" dirty="0"/>
-              <a:t>” table to </a:t>
-            </a:r>
-            <a:r>
-              <a:rPr lang="en-US" dirty="0" smtClean="0"/>
-              <a:t>HDFS</a:t>
-            </a:r>
+              <a:t>tables in database "world" using </a:t>
+            </a:r>
+            <a:r>
+              <a:rPr lang="en-US" dirty="0" err="1" smtClean="0"/>
+              <a:t>Sqoop</a:t>
+            </a:r>
+            <a:endParaRPr lang="en-US" dirty="0" smtClean="0"/>
           </a:p>
           <a:p>
             <a:pPr marL="514350" indent="-514350">
@@ -4098,7 +4089,7 @@
             </a:r>
             <a:r>
               <a:rPr lang="en-US" dirty="0" smtClean="0"/>
-              <a:t>Hive</a:t>
+              <a:t>HDFS</a:t>
             </a:r>
           </a:p>
           <a:p>
@@ -4112,7 +4103,45 @@
             </a:r>
             <a:r>
               <a:rPr lang="en-US" dirty="0"/>
-              <a:t>“cities” table to HDFS using Direct Connector</a:t>
+              <a:t>“</a:t>
+            </a:r>
+            <a:r>
+              <a:rPr lang="en-US" dirty="0" err="1"/>
+              <a:t>cities_coords</a:t>
+            </a:r>
+            <a:r>
+              <a:rPr lang="en-US" dirty="0"/>
+              <a:t>” table to </a:t>
+            </a:r>
+            <a:r>
+              <a:rPr lang="en-US" dirty="0" smtClean="0"/>
+              <a:t>Hive</a:t>
+            </a:r>
+          </a:p>
+          <a:p>
+            <a:pPr marL="514350" indent="-514350">
+              <a:buFont typeface="+mj-lt"/>
+              <a:buAutoNum type="arabicPeriod"/>
+            </a:pPr>
+            <a:r>
+              <a:rPr lang="en-US" dirty="0" smtClean="0"/>
+              <a:t>Load </a:t>
+            </a:r>
+            <a:r>
+              <a:rPr lang="en-US" dirty="0"/>
+              <a:t>“cities” table </a:t>
+            </a:r>
+            <a:r>
+              <a:rPr lang="en-US"/>
+              <a:t>to </a:t>
+            </a:r>
+            <a:r>
+              <a:rPr lang="en-US" smtClean="0"/>
+              <a:t>Hive </a:t>
+            </a:r>
+            <a:r>
+              <a:rPr lang="en-US" dirty="0"/>
+              <a:t>using Direct Connector</a:t>
             </a:r>
           </a:p>
         </p:txBody>
@@ -4151,6 +4180,13 @@
   <p:clrMapOvr>
     <a:masterClrMapping/>
   </p:clrMapOvr>
+  <p:timing>
+    <p:tnLst>
+      <p:par>
+        <p:cTn xmlns:p14="http://schemas.microsoft.com/office/powerpoint/2010/main" id="1" dur="indefinite" restart="never" nodeType="tmRoot"/>
+      </p:par>
+    </p:tnLst>
+  </p:timing>
 </p:sld>
 </file>
 
@@ -4206,8 +4242,28 @@
         </p:nvSpPr>
         <p:spPr/>
         <p:txBody>
-          <a:bodyPr/>
-          <a:lstStyle/>
+          <a:bodyPr>
+            <a:normAutofit fontScale="92500" lnSpcReduction="10000"/>
+          </a:bodyPr>
+          <a:lstStyle/>
+          <a:p>
+            <a:r>
+              <a:rPr lang="en-US" dirty="0" err="1" smtClean="0"/>
+              <a:t>Sudo</a:t>
+            </a:r>
+            <a:r>
+              <a:rPr lang="en-US" dirty="0" smtClean="0"/>
+              <a:t> service </a:t>
+            </a:r>
+            <a:r>
+              <a:rPr lang="en-US" dirty="0" err="1" smtClean="0"/>
+              <a:t>mysqld</a:t>
+            </a:r>
+            <a:r>
+              <a:rPr lang="en-US" dirty="0" smtClean="0"/>
+              <a:t> start </a:t>
+            </a:r>
+          </a:p>
           <a:p>
             <a:r>
               <a:rPr lang="en-US" dirty="0" smtClean="0"/>
@@ -4234,6 +4290,41 @@
             <a:r>
               <a:rPr lang="en-US" dirty="0" smtClean="0"/>
               <a:t> import” is used to get data from the DB to Hadoop</a:t>
+            </a:r>
+          </a:p>
+          <a:p>
+            <a:r>
+              <a:rPr lang="en-US" dirty="0" smtClean="0"/>
+              <a:t>Take a peek at ~/</a:t>
+            </a:r>
+            <a:r>
+              <a:rPr lang="en-US" dirty="0" err="1" smtClean="0"/>
+              <a:t>pl_tutorial</a:t>
+            </a:r>
+            <a:r>
+              <a:rPr lang="en-US" dirty="0" smtClean="0"/>
+              <a:t>/solutions/ex3-sqoop.txt </a:t>
+            </a:r>
+            <a:br>
+              <a:rPr lang="en-US" dirty="0" smtClean="0"/>
+            </a:br>
+            <a:r>
+              <a:rPr lang="en-US" dirty="0" smtClean="0"/>
+              <a:t>and check the JDBC connection string </a:t>
+            </a:r>
+          </a:p>
+          <a:p>
+            <a:r>
+              <a:rPr lang="en-US" dirty="0" smtClean="0"/>
+              <a:t>If /data doesn’t exist – either use an existing </a:t>
+            </a:r>
+            <a:r>
+              <a:rPr lang="en-US" dirty="0" err="1" smtClean="0"/>
+              <a:t>dir</a:t>
+            </a:r>
+            <a:r>
+              <a:rPr lang="en-US" dirty="0" smtClean="0"/>
+              <a:t>, or create it.</a:t>
             </a:r>
             <a:endParaRPr lang="en-US" dirty="0"/>
           </a:p>
@@ -4273,6 +4364,13 @@
   <p:clrMapOvr>
     <a:masterClrMapping/>
   </p:clrMapOvr>
+  <p:timing>
+    <p:tnLst>
+      <p:par>
+        <p:cTn xmlns:p14="http://schemas.microsoft.com/office/powerpoint/2010/main" id="1" dur="indefinite" restart="never" nodeType="tmRoot"/>
+      </p:par>
+    </p:tnLst>
+  </p:timing>
 </p:sld>
 </file>
 
@@ -4816,6 +4914,13 @@
   <p:clrMapOvr>
     <a:masterClrMapping/>
   </p:clrMapOvr>
+  <p:timing>
+    <p:tnLst>
+      <p:par>
+        <p:cTn xmlns:p14="http://schemas.microsoft.com/office/powerpoint/2010/main" id="1" dur="indefinite" restart="never" nodeType="tmRoot"/>
+      </p:par>
+    </p:tnLst>
+  </p:timing>
 </p:sld>
 </file>
 
@@ -4928,6 +5033,13 @@
   <p:clrMapOvr>
     <a:masterClrMapping/>
   </p:clrMapOvr>
+  <p:timing>
+    <p:tnLst>
+      <p:par>
+        <p:cTn xmlns:p14="http://schemas.microsoft.com/office/powerpoint/2010/main" id="1" dur="indefinite" restart="never" nodeType="tmRoot"/>
+      </p:par>
+    </p:tnLst>
+  </p:timing>
 </p:sld>
 </file>
 
@@ -5181,6 +5293,13 @@
   <p:clrMapOvr>
     <a:masterClrMapping/>
   </p:clrMapOvr>
+  <p:timing>
+    <p:tnLst>
+      <p:par>
+        <p:cTn xmlns:p14="http://schemas.microsoft.com/office/powerpoint/2010/main" id="1" dur="indefinite" restart="never" nodeType="tmRoot"/>
+      </p:par>
+    </p:tnLst>
+  </p:timing>
 </p:sld>
 </file>
 
@@ -6086,6 +6205,13 @@
   <p:clrMapOvr>
     <a:masterClrMapping/>
   </p:clrMapOvr>
+  <p:timing>
+    <p:tnLst>
+      <p:par>
+        <p:cTn xmlns:p14="http://schemas.microsoft.com/office/powerpoint/2010/main" id="1" dur="indefinite" restart="never" nodeType="tmRoot"/>
+      </p:par>
+    </p:tnLst>
+  </p:timing>
 </p:sld>
 </file>
 
@@ -6738,14 +6864,7 @@
                 <a:latin typeface="Arial Black"/>
                 <a:cs typeface="Arial Black"/>
               </a:rPr>
-              <a:t>About </a:t>
-            </a:r>
-            <a:r>
-              <a:rPr lang="en-US" sz="4400" dirty="0" smtClean="0">
-                <a:latin typeface="Arial Black"/>
-                <a:cs typeface="Arial Black"/>
-              </a:rPr>
-              <a:t>Oozie</a:t>
+              <a:t>About Oozie</a:t>
             </a:r>
             <a:endParaRPr lang="en-US" sz="4400" dirty="0">
               <a:latin typeface="Arial Black"/>
@@ -7647,14 +7766,7 @@
                 <a:latin typeface="Arial Black"/>
                 <a:cs typeface="Arial Black"/>
               </a:rPr>
-              <a:t>Oozie </a:t>
-            </a:r>
-            <a:r>
-              <a:rPr lang="en-US" sz="4400" dirty="0" smtClean="0">
-                <a:latin typeface="Arial Black"/>
-                <a:cs typeface="Arial Black"/>
-              </a:rPr>
-              <a:t>Practice</a:t>
+              <a:t>Oozie Practice</a:t>
             </a:r>
             <a:endParaRPr lang="en-US" sz="4400" dirty="0">
               <a:latin typeface="Arial Black"/>
@@ -8113,6 +8225,13 @@
   <p:clrMapOvr>
     <a:masterClrMapping/>
   </p:clrMapOvr>
+  <p:timing>
+    <p:tnLst>
+      <p:par>
+        <p:cTn xmlns:p14="http://schemas.microsoft.com/office/powerpoint/2010/main" id="1" dur="indefinite" restart="never" nodeType="tmRoot"/>
+      </p:par>
+    </p:tnLst>
+  </p:timing>
 </p:sld>
 </file>
 
@@ -8154,7 +8273,7 @@
               <a:buNone/>
             </a:pPr>
             <a:r>
-              <a:rPr lang="en-US" sz="4400" smtClean="0">
+              <a:rPr lang="en-US" sz="4400" dirty="0" smtClean="0">
                 <a:latin typeface="Arial Black"/>
                 <a:cs typeface="Arial Black"/>
               </a:rPr>
@@ -8481,6 +8600,13 @@
   <p:clrMapOvr>
     <a:masterClrMapping/>
   </p:clrMapOvr>
+  <p:timing>
+    <p:tnLst>
+      <p:par>
+        <p:cTn xmlns:p14="http://schemas.microsoft.com/office/powerpoint/2010/main" id="1" dur="indefinite" restart="never" nodeType="tmRoot"/>
+      </p:par>
+    </p:tnLst>
+  </p:timing>
 </p:sld>
 </file>
 
@@ -8576,6 +8702,13 @@
   <p:clrMapOvr>
     <a:masterClrMapping/>
   </p:clrMapOvr>
+  <p:timing>
+    <p:tnLst>
+      <p:par>
+        <p:cTn xmlns:p14="http://schemas.microsoft.com/office/powerpoint/2010/main" id="1" dur="indefinite" restart="never" nodeType="tmRoot"/>
+      </p:par>
+    </p:tnLst>
+  </p:timing>
 </p:sld>
 </file>
 
@@ -8752,6 +8885,13 @@
   <p:clrMapOvr>
     <a:masterClrMapping/>
   </p:clrMapOvr>
+  <p:timing>
+    <p:tnLst>
+      <p:par>
+        <p:cTn xmlns:p14="http://schemas.microsoft.com/office/powerpoint/2010/main" id="1" dur="indefinite" restart="never" nodeType="tmRoot"/>
+      </p:par>
+    </p:tnLst>
+  </p:timing>
 </p:sld>
 </file>
 
@@ -8873,6 +9013,13 @@
   <p:clrMapOvr>
     <a:masterClrMapping/>
   </p:clrMapOvr>
+  <p:timing>
+    <p:tnLst>
+      <p:par>
+        <p:cTn xmlns:p14="http://schemas.microsoft.com/office/powerpoint/2010/main" id="1" dur="indefinite" restart="never" nodeType="tmRoot"/>
+      </p:par>
+    </p:tnLst>
+  </p:timing>
 </p:sld>
 </file>
 
@@ -9126,6 +9273,13 @@
   <p:clrMapOvr>
     <a:masterClrMapping/>
   </p:clrMapOvr>
+  <p:timing>
+    <p:tnLst>
+      <p:par>
+        <p:cTn xmlns:p14="http://schemas.microsoft.com/office/powerpoint/2010/main" id="1" dur="indefinite" restart="never" nodeType="tmRoot"/>
+      </p:par>
+    </p:tnLst>
+  </p:timing>
 </p:sld>
 </file>
 
@@ -9221,6 +9375,13 @@
   <p:clrMapOvr>
     <a:masterClrMapping/>
   </p:clrMapOvr>
+  <p:timing>
+    <p:tnLst>
+      <p:par>
+        <p:cTn xmlns:p14="http://schemas.microsoft.com/office/powerpoint/2010/main" id="1" dur="indefinite" restart="never" nodeType="tmRoot"/>
+      </p:par>
+    </p:tnLst>
+  </p:timing>
 </p:sld>
 </file>
 

</xml_diff>